<commit_message>
Lots of changes wrapping up edits to Ch4
</commit_message>
<xml_diff>
--- a/DEBkiss results/Ch4 Base Fig draft.pptx
+++ b/DEBkiss results/Ch4 Base Fig draft.pptx
@@ -104,6 +104,11 @@
       </a:defRPr>
     </a:lvl9pPr>
   </p:defaultTextStyle>
+  <p:extLst>
+    <p:ext uri="{EFAFB233-063F-42B5-8137-9DF3F51BA10A}">
+      <p15:sldGuideLst xmlns:p15="http://schemas.microsoft.com/office/powerpoint/2012/main"/>
+    </p:ext>
+  </p:extLst>
 </p:presentation>
 </file>
 
@@ -238,7 +243,7 @@
           <a:p>
             <a:fld id="{E787EEF8-905E-4527-9814-6D69AAC2B53A}" type="datetimeFigureOut">
               <a:rPr lang="en-US" smtClean="0"/>
-              <a:t>3/21/2023</a:t>
+              <a:t>4/2/2023</a:t>
             </a:fld>
             <a:endParaRPr lang="en-US"/>
           </a:p>
@@ -408,7 +413,7 @@
           <a:p>
             <a:fld id="{E787EEF8-905E-4527-9814-6D69AAC2B53A}" type="datetimeFigureOut">
               <a:rPr lang="en-US" smtClean="0"/>
-              <a:t>3/21/2023</a:t>
+              <a:t>4/2/2023</a:t>
             </a:fld>
             <a:endParaRPr lang="en-US"/>
           </a:p>
@@ -588,7 +593,7 @@
           <a:p>
             <a:fld id="{E787EEF8-905E-4527-9814-6D69AAC2B53A}" type="datetimeFigureOut">
               <a:rPr lang="en-US" smtClean="0"/>
-              <a:t>3/21/2023</a:t>
+              <a:t>4/2/2023</a:t>
             </a:fld>
             <a:endParaRPr lang="en-US"/>
           </a:p>
@@ -758,7 +763,7 @@
           <a:p>
             <a:fld id="{E787EEF8-905E-4527-9814-6D69AAC2B53A}" type="datetimeFigureOut">
               <a:rPr lang="en-US" smtClean="0"/>
-              <a:t>3/21/2023</a:t>
+              <a:t>4/2/2023</a:t>
             </a:fld>
             <a:endParaRPr lang="en-US"/>
           </a:p>
@@ -1002,7 +1007,7 @@
           <a:p>
             <a:fld id="{E787EEF8-905E-4527-9814-6D69AAC2B53A}" type="datetimeFigureOut">
               <a:rPr lang="en-US" smtClean="0"/>
-              <a:t>3/21/2023</a:t>
+              <a:t>4/2/2023</a:t>
             </a:fld>
             <a:endParaRPr lang="en-US"/>
           </a:p>
@@ -1234,7 +1239,7 @@
           <a:p>
             <a:fld id="{E787EEF8-905E-4527-9814-6D69AAC2B53A}" type="datetimeFigureOut">
               <a:rPr lang="en-US" smtClean="0"/>
-              <a:t>3/21/2023</a:t>
+              <a:t>4/2/2023</a:t>
             </a:fld>
             <a:endParaRPr lang="en-US"/>
           </a:p>
@@ -1601,7 +1606,7 @@
           <a:p>
             <a:fld id="{E787EEF8-905E-4527-9814-6D69AAC2B53A}" type="datetimeFigureOut">
               <a:rPr lang="en-US" smtClean="0"/>
-              <a:t>3/21/2023</a:t>
+              <a:t>4/2/2023</a:t>
             </a:fld>
             <a:endParaRPr lang="en-US"/>
           </a:p>
@@ -1719,7 +1724,7 @@
           <a:p>
             <a:fld id="{E787EEF8-905E-4527-9814-6D69AAC2B53A}" type="datetimeFigureOut">
               <a:rPr lang="en-US" smtClean="0"/>
-              <a:t>3/21/2023</a:t>
+              <a:t>4/2/2023</a:t>
             </a:fld>
             <a:endParaRPr lang="en-US"/>
           </a:p>
@@ -1814,7 +1819,7 @@
           <a:p>
             <a:fld id="{E787EEF8-905E-4527-9814-6D69AAC2B53A}" type="datetimeFigureOut">
               <a:rPr lang="en-US" smtClean="0"/>
-              <a:t>3/21/2023</a:t>
+              <a:t>4/2/2023</a:t>
             </a:fld>
             <a:endParaRPr lang="en-US"/>
           </a:p>
@@ -2091,7 +2096,7 @@
           <a:p>
             <a:fld id="{E787EEF8-905E-4527-9814-6D69AAC2B53A}" type="datetimeFigureOut">
               <a:rPr lang="en-US" smtClean="0"/>
-              <a:t>3/21/2023</a:t>
+              <a:t>4/2/2023</a:t>
             </a:fld>
             <a:endParaRPr lang="en-US"/>
           </a:p>
@@ -2348,7 +2353,7 @@
           <a:p>
             <a:fld id="{E787EEF8-905E-4527-9814-6D69AAC2B53A}" type="datetimeFigureOut">
               <a:rPr lang="en-US" smtClean="0"/>
-              <a:t>3/21/2023</a:t>
+              <a:t>4/2/2023</a:t>
             </a:fld>
             <a:endParaRPr lang="en-US"/>
           </a:p>
@@ -2561,7 +2566,7 @@
           <a:p>
             <a:fld id="{E787EEF8-905E-4527-9814-6D69AAC2B53A}" type="datetimeFigureOut">
               <a:rPr lang="en-US" smtClean="0"/>
-              <a:t>3/21/2023</a:t>
+              <a:t>4/2/2023</a:t>
             </a:fld>
             <a:endParaRPr lang="en-US"/>
           </a:p>

</xml_diff>

<commit_message>
a lot of change relating to DEB paper
</commit_message>
<xml_diff>
--- a/DEBkiss results/Ch4 Base Fig draft.pptx
+++ b/DEBkiss results/Ch4 Base Fig draft.pptx
@@ -243,7 +243,7 @@
           <a:p>
             <a:fld id="{E787EEF8-905E-4527-9814-6D69AAC2B53A}" type="datetimeFigureOut">
               <a:rPr lang="en-US" smtClean="0"/>
-              <a:t>4/2/2023</a:t>
+              <a:t>1/7/2024</a:t>
             </a:fld>
             <a:endParaRPr lang="en-US"/>
           </a:p>
@@ -413,7 +413,7 @@
           <a:p>
             <a:fld id="{E787EEF8-905E-4527-9814-6D69AAC2B53A}" type="datetimeFigureOut">
               <a:rPr lang="en-US" smtClean="0"/>
-              <a:t>4/2/2023</a:t>
+              <a:t>1/7/2024</a:t>
             </a:fld>
             <a:endParaRPr lang="en-US"/>
           </a:p>
@@ -593,7 +593,7 @@
           <a:p>
             <a:fld id="{E787EEF8-905E-4527-9814-6D69AAC2B53A}" type="datetimeFigureOut">
               <a:rPr lang="en-US" smtClean="0"/>
-              <a:t>4/2/2023</a:t>
+              <a:t>1/7/2024</a:t>
             </a:fld>
             <a:endParaRPr lang="en-US"/>
           </a:p>
@@ -763,7 +763,7 @@
           <a:p>
             <a:fld id="{E787EEF8-905E-4527-9814-6D69AAC2B53A}" type="datetimeFigureOut">
               <a:rPr lang="en-US" smtClean="0"/>
-              <a:t>4/2/2023</a:t>
+              <a:t>1/7/2024</a:t>
             </a:fld>
             <a:endParaRPr lang="en-US"/>
           </a:p>
@@ -1007,7 +1007,7 @@
           <a:p>
             <a:fld id="{E787EEF8-905E-4527-9814-6D69AAC2B53A}" type="datetimeFigureOut">
               <a:rPr lang="en-US" smtClean="0"/>
-              <a:t>4/2/2023</a:t>
+              <a:t>1/7/2024</a:t>
             </a:fld>
             <a:endParaRPr lang="en-US"/>
           </a:p>
@@ -1239,7 +1239,7 @@
           <a:p>
             <a:fld id="{E787EEF8-905E-4527-9814-6D69AAC2B53A}" type="datetimeFigureOut">
               <a:rPr lang="en-US" smtClean="0"/>
-              <a:t>4/2/2023</a:t>
+              <a:t>1/7/2024</a:t>
             </a:fld>
             <a:endParaRPr lang="en-US"/>
           </a:p>
@@ -1606,7 +1606,7 @@
           <a:p>
             <a:fld id="{E787EEF8-905E-4527-9814-6D69AAC2B53A}" type="datetimeFigureOut">
               <a:rPr lang="en-US" smtClean="0"/>
-              <a:t>4/2/2023</a:t>
+              <a:t>1/7/2024</a:t>
             </a:fld>
             <a:endParaRPr lang="en-US"/>
           </a:p>
@@ -1724,7 +1724,7 @@
           <a:p>
             <a:fld id="{E787EEF8-905E-4527-9814-6D69AAC2B53A}" type="datetimeFigureOut">
               <a:rPr lang="en-US" smtClean="0"/>
-              <a:t>4/2/2023</a:t>
+              <a:t>1/7/2024</a:t>
             </a:fld>
             <a:endParaRPr lang="en-US"/>
           </a:p>
@@ -1819,7 +1819,7 @@
           <a:p>
             <a:fld id="{E787EEF8-905E-4527-9814-6D69AAC2B53A}" type="datetimeFigureOut">
               <a:rPr lang="en-US" smtClean="0"/>
-              <a:t>4/2/2023</a:t>
+              <a:t>1/7/2024</a:t>
             </a:fld>
             <a:endParaRPr lang="en-US"/>
           </a:p>
@@ -2096,7 +2096,7 @@
           <a:p>
             <a:fld id="{E787EEF8-905E-4527-9814-6D69AAC2B53A}" type="datetimeFigureOut">
               <a:rPr lang="en-US" smtClean="0"/>
-              <a:t>4/2/2023</a:t>
+              <a:t>1/7/2024</a:t>
             </a:fld>
             <a:endParaRPr lang="en-US"/>
           </a:p>
@@ -2353,7 +2353,7 @@
           <a:p>
             <a:fld id="{E787EEF8-905E-4527-9814-6D69AAC2B53A}" type="datetimeFigureOut">
               <a:rPr lang="en-US" smtClean="0"/>
-              <a:t>4/2/2023</a:t>
+              <a:t>1/7/2024</a:t>
             </a:fld>
             <a:endParaRPr lang="en-US"/>
           </a:p>
@@ -2566,7 +2566,7 @@
           <a:p>
             <a:fld id="{E787EEF8-905E-4527-9814-6D69AAC2B53A}" type="datetimeFigureOut">
               <a:rPr lang="en-US" smtClean="0"/>
-              <a:t>4/2/2023</a:t>
+              <a:t>1/7/2024</a:t>
             </a:fld>
             <a:endParaRPr lang="en-US"/>
           </a:p>
@@ -3035,7 +3035,7 @@
         </p:blipFill>
         <p:spPr>
           <a:xfrm>
-            <a:off x="17092080" y="1005420"/>
+            <a:off x="18189360" y="1005420"/>
             <a:ext cx="16114320" cy="12085740"/>
           </a:xfrm>
           <a:prstGeom prst="rect">
@@ -3107,7 +3107,7 @@
         </p:blipFill>
         <p:spPr>
           <a:xfrm>
-            <a:off x="17092080" y="13091160"/>
+            <a:off x="18189360" y="13091160"/>
             <a:ext cx="16114320" cy="12085740"/>
           </a:xfrm>
           <a:prstGeom prst="rect">
@@ -3129,7 +3129,7 @@
         </p:nvSpPr>
         <p:spPr>
           <a:xfrm>
-            <a:off x="3825240" y="1264921"/>
+            <a:off x="291960" y="1005420"/>
             <a:ext cx="1371600" cy="1092607"/>
           </a:xfrm>
           <a:prstGeom prst="rect">
@@ -3144,7 +3144,7 @@
           <a:lstStyle/>
           <a:p>
             <a:r>
-              <a:rPr lang="en-US" sz="6500" dirty="0">
+              <a:rPr lang="en-US" sz="6500" b="1" dirty="0">
                 <a:latin typeface="Arial" panose="020B0604020202020204" pitchFamily="34" charset="0"/>
                 <a:cs typeface="Arial" panose="020B0604020202020204" pitchFamily="34" charset="0"/>
               </a:rPr>
@@ -3167,7 +3167,7 @@
         </p:nvSpPr>
         <p:spPr>
           <a:xfrm>
-            <a:off x="19939560" y="1264921"/>
+            <a:off x="17381640" y="1005419"/>
             <a:ext cx="1371600" cy="1092607"/>
           </a:xfrm>
           <a:prstGeom prst="rect">
@@ -3182,7 +3182,7 @@
           <a:lstStyle/>
           <a:p>
             <a:r>
-              <a:rPr lang="en-US" sz="6500" dirty="0">
+              <a:rPr lang="en-US" sz="6500" b="1" dirty="0">
                 <a:latin typeface="Arial" panose="020B0604020202020204" pitchFamily="34" charset="0"/>
                 <a:cs typeface="Arial" panose="020B0604020202020204" pitchFamily="34" charset="0"/>
               </a:rPr>
@@ -3205,7 +3205,7 @@
         </p:nvSpPr>
         <p:spPr>
           <a:xfrm>
-            <a:off x="3825240" y="13350661"/>
+            <a:off x="291960" y="13429343"/>
             <a:ext cx="1371600" cy="1092607"/>
           </a:xfrm>
           <a:prstGeom prst="rect">
@@ -3220,7 +3220,7 @@
           <a:lstStyle/>
           <a:p>
             <a:r>
-              <a:rPr lang="en-US" sz="6500" dirty="0">
+              <a:rPr lang="en-US" sz="6500" b="1" dirty="0">
                 <a:latin typeface="Arial" panose="020B0604020202020204" pitchFamily="34" charset="0"/>
                 <a:cs typeface="Arial" panose="020B0604020202020204" pitchFamily="34" charset="0"/>
               </a:rPr>
@@ -3243,7 +3243,7 @@
         </p:nvSpPr>
         <p:spPr>
           <a:xfrm>
-            <a:off x="20412000" y="13422608"/>
+            <a:off x="17381640" y="13429342"/>
             <a:ext cx="1371600" cy="1092607"/>
           </a:xfrm>
           <a:prstGeom prst="rect">
@@ -3258,7 +3258,7 @@
           <a:lstStyle/>
           <a:p>
             <a:r>
-              <a:rPr lang="en-US" sz="6500" dirty="0">
+              <a:rPr lang="en-US" sz="6500" b="1" dirty="0">
                 <a:latin typeface="Arial" panose="020B0604020202020204" pitchFamily="34" charset="0"/>
                 <a:cs typeface="Arial" panose="020B0604020202020204" pitchFamily="34" charset="0"/>
               </a:rPr>

</xml_diff>